<commit_message>
docs/data_flow.pptx: Make the diagram simpler by removing some redundant uninteresting boxes in the middle
</commit_message>
<xml_diff>
--- a/docs/data_flow.pptx
+++ b/docs/data_flow.pptx
@@ -288,7 +288,7 @@
           <a:p>
             <a:fld id="{BB8F1B3F-F425-43A1-A5D6-4A28EB036C8A}" type="datetimeFigureOut">
               <a:rPr lang="en-US" smtClean="0"/>
-              <a:t>2010-06-07</a:t>
+              <a:t>2010-06-10</a:t>
             </a:fld>
             <a:endParaRPr lang="en-US"/>
           </a:p>
@@ -458,7 +458,7 @@
           <a:p>
             <a:fld id="{BB8F1B3F-F425-43A1-A5D6-4A28EB036C8A}" type="datetimeFigureOut">
               <a:rPr lang="en-US" smtClean="0"/>
-              <a:t>2010-06-07</a:t>
+              <a:t>2010-06-10</a:t>
             </a:fld>
             <a:endParaRPr lang="en-US"/>
           </a:p>
@@ -638,7 +638,7 @@
           <a:p>
             <a:fld id="{BB8F1B3F-F425-43A1-A5D6-4A28EB036C8A}" type="datetimeFigureOut">
               <a:rPr lang="en-US" smtClean="0"/>
-              <a:t>2010-06-07</a:t>
+              <a:t>2010-06-10</a:t>
             </a:fld>
             <a:endParaRPr lang="en-US"/>
           </a:p>
@@ -808,7 +808,7 @@
           <a:p>
             <a:fld id="{BB8F1B3F-F425-43A1-A5D6-4A28EB036C8A}" type="datetimeFigureOut">
               <a:rPr lang="en-US" smtClean="0"/>
-              <a:t>2010-06-07</a:t>
+              <a:t>2010-06-10</a:t>
             </a:fld>
             <a:endParaRPr lang="en-US"/>
           </a:p>
@@ -1054,7 +1054,7 @@
           <a:p>
             <a:fld id="{BB8F1B3F-F425-43A1-A5D6-4A28EB036C8A}" type="datetimeFigureOut">
               <a:rPr lang="en-US" smtClean="0"/>
-              <a:t>2010-06-07</a:t>
+              <a:t>2010-06-10</a:t>
             </a:fld>
             <a:endParaRPr lang="en-US"/>
           </a:p>
@@ -1342,7 +1342,7 @@
           <a:p>
             <a:fld id="{BB8F1B3F-F425-43A1-A5D6-4A28EB036C8A}" type="datetimeFigureOut">
               <a:rPr lang="en-US" smtClean="0"/>
-              <a:t>2010-06-07</a:t>
+              <a:t>2010-06-10</a:t>
             </a:fld>
             <a:endParaRPr lang="en-US"/>
           </a:p>
@@ -1769,7 +1769,7 @@
           <a:p>
             <a:fld id="{BB8F1B3F-F425-43A1-A5D6-4A28EB036C8A}" type="datetimeFigureOut">
               <a:rPr lang="en-US" smtClean="0"/>
-              <a:t>2010-06-07</a:t>
+              <a:t>2010-06-10</a:t>
             </a:fld>
             <a:endParaRPr lang="en-US"/>
           </a:p>
@@ -1887,7 +1887,7 @@
           <a:p>
             <a:fld id="{BB8F1B3F-F425-43A1-A5D6-4A28EB036C8A}" type="datetimeFigureOut">
               <a:rPr lang="en-US" smtClean="0"/>
-              <a:t>2010-06-07</a:t>
+              <a:t>2010-06-10</a:t>
             </a:fld>
             <a:endParaRPr lang="en-US"/>
           </a:p>
@@ -1982,7 +1982,7 @@
           <a:p>
             <a:fld id="{BB8F1B3F-F425-43A1-A5D6-4A28EB036C8A}" type="datetimeFigureOut">
               <a:rPr lang="en-US" smtClean="0"/>
-              <a:t>2010-06-07</a:t>
+              <a:t>2010-06-10</a:t>
             </a:fld>
             <a:endParaRPr lang="en-US"/>
           </a:p>
@@ -2259,7 +2259,7 @@
           <a:p>
             <a:fld id="{BB8F1B3F-F425-43A1-A5D6-4A28EB036C8A}" type="datetimeFigureOut">
               <a:rPr lang="en-US" smtClean="0"/>
-              <a:t>2010-06-07</a:t>
+              <a:t>2010-06-10</a:t>
             </a:fld>
             <a:endParaRPr lang="en-US"/>
           </a:p>
@@ -2512,7 +2512,7 @@
           <a:p>
             <a:fld id="{BB8F1B3F-F425-43A1-A5D6-4A28EB036C8A}" type="datetimeFigureOut">
               <a:rPr lang="en-US" smtClean="0"/>
-              <a:t>2010-06-07</a:t>
+              <a:t>2010-06-10</a:t>
             </a:fld>
             <a:endParaRPr lang="en-US"/>
           </a:p>
@@ -2725,7 +2725,7 @@
           <a:p>
             <a:fld id="{BB8F1B3F-F425-43A1-A5D6-4A28EB036C8A}" type="datetimeFigureOut">
               <a:rPr lang="en-US" smtClean="0"/>
-              <a:t>2010-06-07</a:t>
+              <a:t>2010-06-10</a:t>
             </a:fld>
             <a:endParaRPr lang="en-US"/>
           </a:p>
@@ -3220,8 +3220,8 @@
         </p:nvSpPr>
         <p:spPr>
           <a:xfrm>
-            <a:off x="1476986" y="2924788"/>
-            <a:ext cx="717120" cy="461665"/>
+            <a:off x="1501544" y="2924788"/>
+            <a:ext cx="668003" cy="461665"/>
           </a:xfrm>
           <a:prstGeom prst="rect">
             <a:avLst/>
@@ -3241,8 +3241,13 @@
                 <a:ea typeface="Tahoma" pitchFamily="34" charset="0"/>
                 <a:cs typeface="Tahoma" pitchFamily="34" charset="0"/>
               </a:rPr>
-              <a:t>Minerva</a:t>
-            </a:r>
+              <a:t>Client</a:t>
+            </a:r>
+            <a:endParaRPr lang="en-US" sz="1200" dirty="0" smtClean="0">
+              <a:latin typeface="Tahoma" pitchFamily="34" charset="0"/>
+              <a:ea typeface="Tahoma" pitchFamily="34" charset="0"/>
+              <a:cs typeface="Tahoma" pitchFamily="34" charset="0"/>
+            </a:endParaRPr>
           </a:p>
           <a:p>
             <a:pPr algn="ctr"/>
@@ -3270,7 +3275,7 @@
         </p:nvSpPr>
         <p:spPr>
           <a:xfrm>
-            <a:off x="797441" y="2215173"/>
+            <a:off x="797441" y="2119923"/>
             <a:ext cx="2098159" cy="553998"/>
           </a:xfrm>
           <a:prstGeom prst="rect">
@@ -3290,7 +3295,15 @@
                 <a:ea typeface="Tahoma" pitchFamily="34" charset="0"/>
                 <a:cs typeface="Tahoma" pitchFamily="34" charset="0"/>
               </a:rPr>
-              <a:t>Stream creates transports.</a:t>
+              <a:t>Client Stream </a:t>
+            </a:r>
+            <a:r>
+              <a:rPr lang="en-US" sz="1000" dirty="0" smtClean="0">
+                <a:latin typeface="Tahoma" pitchFamily="34" charset="0"/>
+                <a:ea typeface="Tahoma" pitchFamily="34" charset="0"/>
+                <a:cs typeface="Tahoma" pitchFamily="34" charset="0"/>
+              </a:rPr>
+              <a:t>creates transports.</a:t>
             </a:r>
           </a:p>
           <a:p>
@@ -3539,7 +3552,7 @@
         </p:nvSpPr>
         <p:spPr>
           <a:xfrm>
-            <a:off x="2819402" y="2696188"/>
+            <a:off x="2886077" y="2696188"/>
             <a:ext cx="800797" cy="461665"/>
           </a:xfrm>
           <a:prstGeom prst="rect">
@@ -3589,7 +3602,7 @@
         </p:nvSpPr>
         <p:spPr>
           <a:xfrm>
-            <a:off x="2722390" y="3079203"/>
+            <a:off x="2789065" y="3079203"/>
             <a:ext cx="1015022" cy="461665"/>
           </a:xfrm>
           <a:prstGeom prst="rect">
@@ -3683,8 +3696,8 @@
         </p:nvSpPr>
         <p:spPr>
           <a:xfrm>
-            <a:off x="2819400" y="1805226"/>
-            <a:ext cx="1828800" cy="861774"/>
+            <a:off x="2809875" y="1805226"/>
+            <a:ext cx="1817208" cy="861774"/>
           </a:xfrm>
           <a:prstGeom prst="rect">
             <a:avLst/>
@@ -3703,227 +3716,87 @@
                 <a:ea typeface="Tahoma" pitchFamily="34" charset="0"/>
                 <a:cs typeface="Tahoma" pitchFamily="34" charset="0"/>
               </a:rPr>
-              <a:t>Primary receives strings. Secondary transport only needed if primary is HTTP. Can’t upload data over an already-open HTTP request.</a:t>
+              <a:t>Primary receives strings. Secondary transport </a:t>
+            </a:r>
+            <a:r>
+              <a:rPr lang="en-US" sz="1000" dirty="0" smtClean="0">
+                <a:latin typeface="Tahoma" pitchFamily="34" charset="0"/>
+                <a:ea typeface="Tahoma" pitchFamily="34" charset="0"/>
+                <a:cs typeface="Tahoma" pitchFamily="34" charset="0"/>
+              </a:rPr>
+              <a:t>is only </a:t>
+            </a:r>
+            <a:r>
+              <a:rPr lang="en-US" sz="1000" dirty="0" smtClean="0">
+                <a:latin typeface="Tahoma" pitchFamily="34" charset="0"/>
+                <a:ea typeface="Tahoma" pitchFamily="34" charset="0"/>
+                <a:cs typeface="Tahoma" pitchFamily="34" charset="0"/>
+              </a:rPr>
+              <a:t>needed if primary is </a:t>
+            </a:r>
+            <a:r>
+              <a:rPr lang="en-US" sz="1000" dirty="0" smtClean="0">
+                <a:latin typeface="Tahoma" pitchFamily="34" charset="0"/>
+                <a:ea typeface="Tahoma" pitchFamily="34" charset="0"/>
+                <a:cs typeface="Tahoma" pitchFamily="34" charset="0"/>
+              </a:rPr>
+              <a:t>HTTP,</a:t>
+            </a:r>
+          </a:p>
+          <a:p>
+            <a:r>
+              <a:rPr lang="en-US" sz="1000" dirty="0" smtClean="0">
+                <a:latin typeface="Tahoma" pitchFamily="34" charset="0"/>
+                <a:ea typeface="Tahoma" pitchFamily="34" charset="0"/>
+                <a:cs typeface="Tahoma" pitchFamily="34" charset="0"/>
+              </a:rPr>
+              <a:t>because </a:t>
+            </a:r>
+            <a:r>
+              <a:rPr lang="en-US" sz="1000" dirty="0">
+                <a:latin typeface="Tahoma" pitchFamily="34" charset="0"/>
+                <a:ea typeface="Tahoma" pitchFamily="34" charset="0"/>
+                <a:cs typeface="Tahoma" pitchFamily="34" charset="0"/>
+              </a:rPr>
+              <a:t>c</a:t>
+            </a:r>
+            <a:r>
+              <a:rPr lang="en-US" sz="1000" dirty="0" smtClean="0">
+                <a:latin typeface="Tahoma" pitchFamily="34" charset="0"/>
+                <a:ea typeface="Tahoma" pitchFamily="34" charset="0"/>
+                <a:cs typeface="Tahoma" pitchFamily="34" charset="0"/>
+              </a:rPr>
+              <a:t>an’t </a:t>
+            </a:r>
+            <a:r>
+              <a:rPr lang="en-US" sz="1000" dirty="0" smtClean="0">
+                <a:latin typeface="Tahoma" pitchFamily="34" charset="0"/>
+                <a:ea typeface="Tahoma" pitchFamily="34" charset="0"/>
+                <a:cs typeface="Tahoma" pitchFamily="34" charset="0"/>
+              </a:rPr>
+              <a:t>upload data </a:t>
+            </a:r>
+            <a:r>
+              <a:rPr lang="en-US" sz="1000" dirty="0" smtClean="0">
+                <a:latin typeface="Tahoma" pitchFamily="34" charset="0"/>
+                <a:ea typeface="Tahoma" pitchFamily="34" charset="0"/>
+                <a:cs typeface="Tahoma" pitchFamily="34" charset="0"/>
+              </a:rPr>
+              <a:t>after opening HTTP </a:t>
+            </a:r>
+            <a:r>
+              <a:rPr lang="en-US" sz="1000" dirty="0" smtClean="0">
+                <a:latin typeface="Tahoma" pitchFamily="34" charset="0"/>
+                <a:ea typeface="Tahoma" pitchFamily="34" charset="0"/>
+                <a:cs typeface="Tahoma" pitchFamily="34" charset="0"/>
+              </a:rPr>
+              <a:t>request.</a:t>
             </a:r>
             <a:endParaRPr lang="en-US" sz="1000" dirty="0">
               <a:latin typeface="Tahoma" pitchFamily="34" charset="0"/>
               <a:ea typeface="Tahoma" pitchFamily="34" charset="0"/>
               <a:cs typeface="Tahoma" pitchFamily="34" charset="0"/>
             </a:endParaRPr>
-          </a:p>
-        </p:txBody>
-      </p:sp>
-      <p:cxnSp>
-        <p:nvCxnSpPr>
-          <p:cNvPr id="18" name="Straight Arrow Connector 17"/>
-          <p:cNvCxnSpPr/>
-          <p:nvPr/>
-        </p:nvCxnSpPr>
-        <p:spPr>
-          <a:xfrm>
-            <a:off x="3660224" y="2877768"/>
-            <a:ext cx="586737" cy="0"/>
-          </a:xfrm>
-          <a:prstGeom prst="straightConnector1">
-            <a:avLst/>
-          </a:prstGeom>
-          <a:ln w="19050" cap="flat">
-            <a:solidFill>
-              <a:schemeClr val="tx1"/>
-            </a:solidFill>
-            <a:round/>
-            <a:tailEnd type="triangle"/>
-          </a:ln>
-        </p:spPr>
-        <p:style>
-          <a:lnRef idx="1">
-            <a:schemeClr val="accent1"/>
-          </a:lnRef>
-          <a:fillRef idx="0">
-            <a:schemeClr val="accent1"/>
-          </a:fillRef>
-          <a:effectRef idx="0">
-            <a:schemeClr val="accent1"/>
-          </a:effectRef>
-          <a:fontRef idx="minor">
-            <a:schemeClr val="tx1"/>
-          </a:fontRef>
-        </p:style>
-      </p:cxnSp>
-      <p:cxnSp>
-        <p:nvCxnSpPr>
-          <p:cNvPr id="19" name="Straight Arrow Connector 18"/>
-          <p:cNvCxnSpPr/>
-          <p:nvPr/>
-        </p:nvCxnSpPr>
-        <p:spPr>
-          <a:xfrm flipH="1">
-            <a:off x="3657602" y="2953968"/>
-            <a:ext cx="586739" cy="0"/>
-          </a:xfrm>
-          <a:prstGeom prst="straightConnector1">
-            <a:avLst/>
-          </a:prstGeom>
-          <a:ln w="19050" cap="flat">
-            <a:solidFill>
-              <a:schemeClr val="tx1"/>
-            </a:solidFill>
-            <a:round/>
-            <a:tailEnd type="triangle"/>
-          </a:ln>
-        </p:spPr>
-        <p:style>
-          <a:lnRef idx="1">
-            <a:schemeClr val="accent1"/>
-          </a:lnRef>
-          <a:fillRef idx="0">
-            <a:schemeClr val="accent1"/>
-          </a:fillRef>
-          <a:effectRef idx="0">
-            <a:schemeClr val="accent1"/>
-          </a:effectRef>
-          <a:fontRef idx="minor">
-            <a:schemeClr val="tx1"/>
-          </a:fontRef>
-        </p:style>
-      </p:cxnSp>
-      <p:cxnSp>
-        <p:nvCxnSpPr>
-          <p:cNvPr id="20" name="Straight Arrow Connector 19"/>
-          <p:cNvCxnSpPr/>
-          <p:nvPr/>
-        </p:nvCxnSpPr>
-        <p:spPr>
-          <a:xfrm>
-            <a:off x="3675921" y="3254303"/>
-            <a:ext cx="586737" cy="0"/>
-          </a:xfrm>
-          <a:prstGeom prst="straightConnector1">
-            <a:avLst/>
-          </a:prstGeom>
-          <a:ln w="19050" cap="flat">
-            <a:solidFill>
-              <a:schemeClr val="tx1"/>
-            </a:solidFill>
-            <a:round/>
-            <a:tailEnd type="triangle"/>
-          </a:ln>
-        </p:spPr>
-        <p:style>
-          <a:lnRef idx="1">
-            <a:schemeClr val="accent1"/>
-          </a:lnRef>
-          <a:fillRef idx="0">
-            <a:schemeClr val="accent1"/>
-          </a:fillRef>
-          <a:effectRef idx="0">
-            <a:schemeClr val="accent1"/>
-          </a:effectRef>
-          <a:fontRef idx="minor">
-            <a:schemeClr val="tx1"/>
-          </a:fontRef>
-        </p:style>
-      </p:cxnSp>
-      <p:cxnSp>
-        <p:nvCxnSpPr>
-          <p:cNvPr id="21" name="Straight Arrow Connector 20"/>
-          <p:cNvCxnSpPr/>
-          <p:nvPr/>
-        </p:nvCxnSpPr>
-        <p:spPr>
-          <a:xfrm flipH="1">
-            <a:off x="3673299" y="3340231"/>
-            <a:ext cx="586739" cy="0"/>
-          </a:xfrm>
-          <a:prstGeom prst="straightConnector1">
-            <a:avLst/>
-          </a:prstGeom>
-          <a:ln w="19050" cap="flat">
-            <a:solidFill>
-              <a:schemeClr val="tx1"/>
-            </a:solidFill>
-            <a:round/>
-            <a:tailEnd type="triangle"/>
-          </a:ln>
-        </p:spPr>
-        <p:style>
-          <a:lnRef idx="1">
-            <a:schemeClr val="accent1"/>
-          </a:lnRef>
-          <a:fillRef idx="0">
-            <a:schemeClr val="accent1"/>
-          </a:fillRef>
-          <a:effectRef idx="0">
-            <a:schemeClr val="accent1"/>
-          </a:effectRef>
-          <a:fontRef idx="minor">
-            <a:schemeClr val="tx1"/>
-          </a:fontRef>
-        </p:style>
-      </p:cxnSp>
-      <p:sp>
-        <p:nvSpPr>
-          <p:cNvPr id="22" name="TextBox 21"/>
-          <p:cNvSpPr txBox="1"/>
-          <p:nvPr/>
-        </p:nvSpPr>
-        <p:spPr>
-          <a:xfrm>
-            <a:off x="4235482" y="2771005"/>
-            <a:ext cx="869918" cy="276999"/>
-          </a:xfrm>
-          <a:prstGeom prst="rect">
-            <a:avLst/>
-          </a:prstGeom>
-          <a:noFill/>
-        </p:spPr>
-        <p:txBody>
-          <a:bodyPr wrap="none" rtlCol="0">
-            <a:spAutoFit/>
-          </a:bodyPr>
-          <a:lstStyle/>
-          <a:p>
-            <a:r>
-              <a:rPr lang="en-US" sz="1200" dirty="0" smtClean="0">
-                <a:latin typeface="Tahoma" pitchFamily="34" charset="0"/>
-                <a:ea typeface="Tahoma" pitchFamily="34" charset="0"/>
-                <a:cs typeface="Tahoma" pitchFamily="34" charset="0"/>
-              </a:rPr>
-              <a:t>TCP/HTTP</a:t>
-            </a:r>
-          </a:p>
-        </p:txBody>
-      </p:sp>
-      <p:sp>
-        <p:nvSpPr>
-          <p:cNvPr id="23" name="TextBox 22"/>
-          <p:cNvSpPr txBox="1"/>
-          <p:nvPr/>
-        </p:nvSpPr>
-        <p:spPr>
-          <a:xfrm>
-            <a:off x="4232234" y="3130316"/>
-            <a:ext cx="869918" cy="276999"/>
-          </a:xfrm>
-          <a:prstGeom prst="rect">
-            <a:avLst/>
-          </a:prstGeom>
-          <a:noFill/>
-        </p:spPr>
-        <p:txBody>
-          <a:bodyPr wrap="none" rtlCol="0">
-            <a:spAutoFit/>
-          </a:bodyPr>
-          <a:lstStyle/>
-          <a:p>
-            <a:r>
-              <a:rPr lang="en-US" sz="1200" dirty="0" smtClean="0">
-                <a:latin typeface="Tahoma" pitchFamily="34" charset="0"/>
-                <a:ea typeface="Tahoma" pitchFamily="34" charset="0"/>
-                <a:cs typeface="Tahoma" pitchFamily="34" charset="0"/>
-              </a:rPr>
-              <a:t>TCP/HTTP</a:t>
-            </a:r>
           </a:p>
         </p:txBody>
       </p:sp>
@@ -3935,7 +3808,7 @@
         </p:nvCxnSpPr>
         <p:spPr>
           <a:xfrm>
-            <a:off x="5092327" y="2876546"/>
+            <a:off x="3842485" y="2876546"/>
             <a:ext cx="586737" cy="0"/>
           </a:xfrm>
           <a:prstGeom prst="straightConnector1">
@@ -3973,7 +3846,7 @@
         </p:nvCxnSpPr>
         <p:spPr>
           <a:xfrm flipH="1">
-            <a:off x="5089705" y="2952746"/>
+            <a:off x="3839863" y="2952746"/>
             <a:ext cx="586739" cy="0"/>
           </a:xfrm>
           <a:prstGeom prst="straightConnector1">
@@ -4011,7 +3884,7 @@
         </p:nvCxnSpPr>
         <p:spPr>
           <a:xfrm>
-            <a:off x="5108024" y="3253081"/>
+            <a:off x="3858182" y="3253081"/>
             <a:ext cx="586737" cy="0"/>
           </a:xfrm>
           <a:prstGeom prst="straightConnector1">
@@ -4049,7 +3922,7 @@
         </p:nvCxnSpPr>
         <p:spPr>
           <a:xfrm flipH="1">
-            <a:off x="5085946" y="3329281"/>
+            <a:off x="3836104" y="3329281"/>
             <a:ext cx="586739" cy="0"/>
           </a:xfrm>
           <a:prstGeom prst="straightConnector1">
@@ -4087,8 +3960,8 @@
         </p:nvSpPr>
         <p:spPr>
           <a:xfrm rot="16200000">
-            <a:off x="2934730" y="2028128"/>
-            <a:ext cx="123217" cy="4186736"/>
+            <a:off x="2409178" y="2553681"/>
+            <a:ext cx="123219" cy="3135629"/>
           </a:xfrm>
           <a:prstGeom prst="leftBrace">
             <a:avLst/>
@@ -4133,7 +4006,7 @@
         </p:nvSpPr>
         <p:spPr>
           <a:xfrm>
-            <a:off x="2514602" y="4173379"/>
+            <a:off x="2001663" y="4173379"/>
             <a:ext cx="970137" cy="246221"/>
           </a:xfrm>
           <a:prstGeom prst="rect">
@@ -4160,14 +4033,14 @@
       </p:sp>
       <p:sp>
         <p:nvSpPr>
-          <p:cNvPr id="30" name="TextBox 29"/>
+          <p:cNvPr id="36" name="TextBox 35"/>
           <p:cNvSpPr txBox="1"/>
           <p:nvPr/>
         </p:nvSpPr>
         <p:spPr>
           <a:xfrm>
-            <a:off x="5635396" y="2769175"/>
-            <a:ext cx="869918" cy="276999"/>
+            <a:off x="3657600" y="3409890"/>
+            <a:ext cx="979008" cy="553998"/>
           </a:xfrm>
           <a:prstGeom prst="rect">
             <a:avLst/>
@@ -4175,75 +4048,49 @@
           <a:noFill/>
         </p:spPr>
         <p:txBody>
-          <a:bodyPr wrap="none" rtlCol="0">
+          <a:bodyPr wrap="square" rtlCol="0">
             <a:spAutoFit/>
           </a:bodyPr>
           <a:lstStyle/>
           <a:p>
-            <a:r>
-              <a:rPr lang="en-US" sz="1200" dirty="0" smtClean="0">
-                <a:latin typeface="Tahoma" pitchFamily="34" charset="0"/>
-                <a:ea typeface="Tahoma" pitchFamily="34" charset="0"/>
-                <a:cs typeface="Tahoma" pitchFamily="34" charset="0"/>
-              </a:rPr>
-              <a:t>TCP/HTTP</a:t>
-            </a:r>
-          </a:p>
-        </p:txBody>
-      </p:sp>
-      <p:sp>
-        <p:nvSpPr>
-          <p:cNvPr id="31" name="TextBox 30"/>
-          <p:cNvSpPr txBox="1"/>
+            <a:pPr algn="ctr"/>
+            <a:r>
+              <a:rPr lang="en-US" sz="1000" dirty="0" smtClean="0">
+                <a:latin typeface="Tahoma" pitchFamily="34" charset="0"/>
+                <a:ea typeface="Tahoma" pitchFamily="34" charset="0"/>
+                <a:cs typeface="Tahoma" pitchFamily="34" charset="0"/>
+              </a:rPr>
+              <a:t>Minerva wire protocol over TCP or HTTP</a:t>
+            </a:r>
+            <a:endParaRPr lang="en-US" sz="1000" dirty="0">
+              <a:latin typeface="Tahoma" pitchFamily="34" charset="0"/>
+              <a:ea typeface="Tahoma" pitchFamily="34" charset="0"/>
+              <a:cs typeface="Tahoma" pitchFamily="34" charset="0"/>
+            </a:endParaRPr>
+          </a:p>
+        </p:txBody>
+      </p:sp>
+      <p:sp>
+        <p:nvSpPr>
+          <p:cNvPr id="42" name="Left Brace 41"/>
+          <p:cNvSpPr/>
           <p:nvPr/>
         </p:nvSpPr>
         <p:spPr>
-          <a:xfrm>
-            <a:off x="5632148" y="3128486"/>
-            <a:ext cx="869918" cy="276999"/>
-          </a:xfrm>
-          <a:prstGeom prst="rect">
+          <a:xfrm rot="16200000">
+            <a:off x="5797879" y="2529209"/>
+            <a:ext cx="123218" cy="3184571"/>
+          </a:xfrm>
+          <a:prstGeom prst="leftBrace">
             <a:avLst/>
           </a:prstGeom>
-          <a:noFill/>
-        </p:spPr>
-        <p:txBody>
-          <a:bodyPr wrap="none" rtlCol="0">
-            <a:spAutoFit/>
-          </a:bodyPr>
-          <a:lstStyle/>
-          <a:p>
-            <a:r>
-              <a:rPr lang="en-US" sz="1200" dirty="0" smtClean="0">
-                <a:latin typeface="Tahoma" pitchFamily="34" charset="0"/>
-                <a:ea typeface="Tahoma" pitchFamily="34" charset="0"/>
-                <a:cs typeface="Tahoma" pitchFamily="34" charset="0"/>
-              </a:rPr>
-              <a:t>TCP/HTTP</a:t>
-            </a:r>
-          </a:p>
-        </p:txBody>
-      </p:sp>
-      <p:cxnSp>
-        <p:nvCxnSpPr>
-          <p:cNvPr id="32" name="Straight Arrow Connector 31"/>
-          <p:cNvCxnSpPr/>
-          <p:nvPr/>
-        </p:nvCxnSpPr>
-        <p:spPr>
-          <a:xfrm>
-            <a:off x="6492240" y="2874716"/>
-            <a:ext cx="586737" cy="0"/>
-          </a:xfrm>
-          <a:prstGeom prst="straightConnector1">
-            <a:avLst/>
-          </a:prstGeom>
-          <a:ln w="19050" cap="flat">
+          <a:ln w="19050">
             <a:solidFill>
-              <a:schemeClr val="tx1"/>
+              <a:schemeClr val="tx1">
+                <a:lumMod val="50000"/>
+                <a:lumOff val="50000"/>
+              </a:schemeClr>
             </a:solidFill>
-            <a:round/>
-            <a:tailEnd type="triangle"/>
           </a:ln>
         </p:spPr>
         <p:style>
@@ -4260,128 +4107,25 @@
             <a:schemeClr val="tx1"/>
           </a:fontRef>
         </p:style>
-      </p:cxnSp>
-      <p:cxnSp>
-        <p:nvCxnSpPr>
-          <p:cNvPr id="33" name="Straight Arrow Connector 32"/>
-          <p:cNvCxnSpPr/>
-          <p:nvPr/>
-        </p:nvCxnSpPr>
-        <p:spPr>
-          <a:xfrm flipH="1">
-            <a:off x="6489618" y="2950916"/>
-            <a:ext cx="586739" cy="0"/>
-          </a:xfrm>
-          <a:prstGeom prst="straightConnector1">
-            <a:avLst/>
-          </a:prstGeom>
-          <a:ln w="19050" cap="flat">
-            <a:solidFill>
-              <a:schemeClr val="tx1"/>
-            </a:solidFill>
-            <a:round/>
-            <a:tailEnd type="triangle"/>
-          </a:ln>
-        </p:spPr>
-        <p:style>
-          <a:lnRef idx="1">
-            <a:schemeClr val="accent1"/>
-          </a:lnRef>
-          <a:fillRef idx="0">
-            <a:schemeClr val="accent1"/>
-          </a:fillRef>
-          <a:effectRef idx="0">
-            <a:schemeClr val="accent1"/>
-          </a:effectRef>
-          <a:fontRef idx="minor">
-            <a:schemeClr val="tx1"/>
-          </a:fontRef>
-        </p:style>
-      </p:cxnSp>
-      <p:cxnSp>
-        <p:nvCxnSpPr>
-          <p:cNvPr id="34" name="Straight Arrow Connector 33"/>
-          <p:cNvCxnSpPr/>
-          <p:nvPr/>
-        </p:nvCxnSpPr>
-        <p:spPr>
-          <a:xfrm>
-            <a:off x="6507937" y="3251251"/>
-            <a:ext cx="586737" cy="0"/>
-          </a:xfrm>
-          <a:prstGeom prst="straightConnector1">
-            <a:avLst/>
-          </a:prstGeom>
-          <a:ln w="19050" cap="flat">
-            <a:solidFill>
-              <a:schemeClr val="tx1"/>
-            </a:solidFill>
-            <a:round/>
-            <a:tailEnd type="triangle"/>
-          </a:ln>
-        </p:spPr>
-        <p:style>
-          <a:lnRef idx="1">
-            <a:schemeClr val="accent1"/>
-          </a:lnRef>
-          <a:fillRef idx="0">
-            <a:schemeClr val="accent1"/>
-          </a:fillRef>
-          <a:effectRef idx="0">
-            <a:schemeClr val="accent1"/>
-          </a:effectRef>
-          <a:fontRef idx="minor">
-            <a:schemeClr val="tx1"/>
-          </a:fontRef>
-        </p:style>
-      </p:cxnSp>
-      <p:cxnSp>
-        <p:nvCxnSpPr>
-          <p:cNvPr id="35" name="Straight Arrow Connector 34"/>
-          <p:cNvCxnSpPr/>
-          <p:nvPr/>
-        </p:nvCxnSpPr>
-        <p:spPr>
-          <a:xfrm flipH="1">
-            <a:off x="6485859" y="3327451"/>
-            <a:ext cx="586739" cy="0"/>
-          </a:xfrm>
-          <a:prstGeom prst="straightConnector1">
-            <a:avLst/>
-          </a:prstGeom>
-          <a:ln w="19050" cap="flat">
-            <a:solidFill>
-              <a:schemeClr val="tx1"/>
-            </a:solidFill>
-            <a:round/>
-            <a:tailEnd type="triangle"/>
-          </a:ln>
-        </p:spPr>
-        <p:style>
-          <a:lnRef idx="1">
-            <a:schemeClr val="accent1"/>
-          </a:lnRef>
-          <a:fillRef idx="0">
-            <a:schemeClr val="accent1"/>
-          </a:fillRef>
-          <a:effectRef idx="0">
-            <a:schemeClr val="accent1"/>
-          </a:effectRef>
-          <a:fontRef idx="minor">
-            <a:schemeClr val="tx1"/>
-          </a:fontRef>
-        </p:style>
-      </p:cxnSp>
-      <p:sp>
-        <p:nvSpPr>
-          <p:cNvPr id="36" name="TextBox 35"/>
+        <p:txBody>
+          <a:bodyPr rtlCol="0" anchor="ctr"/>
+          <a:lstStyle/>
+          <a:p>
+            <a:pPr algn="ctr"/>
+            <a:endParaRPr lang="en-US" dirty="0"/>
+          </a:p>
+        </p:txBody>
+      </p:sp>
+      <p:sp>
+        <p:nvSpPr>
+          <p:cNvPr id="43" name="TextBox 42"/>
           <p:cNvSpPr txBox="1"/>
           <p:nvPr/>
         </p:nvSpPr>
         <p:spPr>
           <a:xfrm>
-            <a:off x="4907442" y="3409890"/>
-            <a:ext cx="979008" cy="400110"/>
+            <a:off x="5380969" y="4173379"/>
+            <a:ext cx="1019831" cy="246221"/>
           </a:xfrm>
           <a:prstGeom prst="rect">
             <a:avLst/>
@@ -4389,125 +4133,6 @@
           <a:noFill/>
         </p:spPr>
         <p:txBody>
-          <a:bodyPr wrap="square" rtlCol="0">
-            <a:spAutoFit/>
-          </a:bodyPr>
-          <a:lstStyle/>
-          <a:p>
-            <a:pPr algn="ctr"/>
-            <a:r>
-              <a:rPr lang="en-US" sz="1000" dirty="0" smtClean="0">
-                <a:latin typeface="Tahoma" pitchFamily="34" charset="0"/>
-                <a:ea typeface="Tahoma" pitchFamily="34" charset="0"/>
-                <a:cs typeface="Tahoma" pitchFamily="34" charset="0"/>
-              </a:rPr>
-              <a:t>TCP stream over Internet</a:t>
-            </a:r>
-            <a:endParaRPr lang="en-US" sz="1000" dirty="0">
-              <a:latin typeface="Tahoma" pitchFamily="34" charset="0"/>
-              <a:ea typeface="Tahoma" pitchFamily="34" charset="0"/>
-              <a:cs typeface="Tahoma" pitchFamily="34" charset="0"/>
-            </a:endParaRPr>
-          </a:p>
-        </p:txBody>
-      </p:sp>
-      <p:sp>
-        <p:nvSpPr>
-          <p:cNvPr id="40" name="TextBox 39"/>
-          <p:cNvSpPr txBox="1"/>
-          <p:nvPr/>
-        </p:nvSpPr>
-        <p:spPr>
-          <a:xfrm>
-            <a:off x="3505200" y="3409890"/>
-            <a:ext cx="915923" cy="400110"/>
-          </a:xfrm>
-          <a:prstGeom prst="rect">
-            <a:avLst/>
-          </a:prstGeom>
-          <a:noFill/>
-        </p:spPr>
-        <p:txBody>
-          <a:bodyPr wrap="square" rtlCol="0">
-            <a:spAutoFit/>
-          </a:bodyPr>
-          <a:lstStyle/>
-          <a:p>
-            <a:pPr algn="ctr"/>
-            <a:r>
-              <a:rPr lang="en-US" sz="1000" dirty="0" smtClean="0">
-                <a:latin typeface="Tahoma" pitchFamily="34" charset="0"/>
-                <a:ea typeface="Tahoma" pitchFamily="34" charset="0"/>
-                <a:cs typeface="Tahoma" pitchFamily="34" charset="0"/>
-              </a:rPr>
-              <a:t>Minerva wire protocol</a:t>
-            </a:r>
-          </a:p>
-        </p:txBody>
-      </p:sp>
-      <p:sp>
-        <p:nvSpPr>
-          <p:cNvPr id="42" name="Left Brace 41"/>
-          <p:cNvSpPr/>
-          <p:nvPr/>
-        </p:nvSpPr>
-        <p:spPr>
-          <a:xfrm rot="16200000">
-            <a:off x="7795221" y="1979665"/>
-            <a:ext cx="123219" cy="4283660"/>
-          </a:xfrm>
-          <a:prstGeom prst="leftBrace">
-            <a:avLst/>
-          </a:prstGeom>
-          <a:ln w="19050">
-            <a:solidFill>
-              <a:schemeClr val="tx1">
-                <a:lumMod val="50000"/>
-                <a:lumOff val="50000"/>
-              </a:schemeClr>
-            </a:solidFill>
-          </a:ln>
-        </p:spPr>
-        <p:style>
-          <a:lnRef idx="1">
-            <a:schemeClr val="accent1"/>
-          </a:lnRef>
-          <a:fillRef idx="0">
-            <a:schemeClr val="accent1"/>
-          </a:fillRef>
-          <a:effectRef idx="0">
-            <a:schemeClr val="accent1"/>
-          </a:effectRef>
-          <a:fontRef idx="minor">
-            <a:schemeClr val="tx1"/>
-          </a:fontRef>
-        </p:style>
-        <p:txBody>
-          <a:bodyPr rtlCol="0" anchor="ctr"/>
-          <a:lstStyle/>
-          <a:p>
-            <a:pPr algn="ctr"/>
-            <a:endParaRPr lang="en-US" dirty="0"/>
-          </a:p>
-        </p:txBody>
-      </p:sp>
-      <p:sp>
-        <p:nvSpPr>
-          <p:cNvPr id="43" name="TextBox 42"/>
-          <p:cNvSpPr txBox="1"/>
-          <p:nvPr/>
-        </p:nvSpPr>
-        <p:spPr>
-          <a:xfrm>
-            <a:off x="7326632" y="4173379"/>
-            <a:ext cx="1019831" cy="246221"/>
-          </a:xfrm>
-          <a:prstGeom prst="rect">
-            <a:avLst/>
-          </a:prstGeom>
-          <a:noFill/>
-        </p:spPr>
-        <p:txBody>
           <a:bodyPr wrap="none" rtlCol="0">
             <a:spAutoFit/>
           </a:bodyPr>
@@ -4532,7 +4157,7 @@
         </p:nvSpPr>
         <p:spPr>
           <a:xfrm>
-            <a:off x="7183612" y="2696188"/>
+            <a:off x="4608149" y="2696188"/>
             <a:ext cx="800797" cy="461665"/>
           </a:xfrm>
           <a:prstGeom prst="rect">
@@ -4582,7 +4207,7 @@
         </p:nvSpPr>
         <p:spPr>
           <a:xfrm>
-            <a:off x="7086600" y="3079203"/>
+            <a:off x="4511137" y="3079203"/>
             <a:ext cx="1015022" cy="461665"/>
           </a:xfrm>
           <a:prstGeom prst="rect">
@@ -4627,7 +4252,7 @@
         </p:nvCxnSpPr>
         <p:spPr>
           <a:xfrm>
-            <a:off x="8047534" y="2857504"/>
+            <a:off x="5500646" y="2857504"/>
             <a:ext cx="586737" cy="0"/>
           </a:xfrm>
           <a:prstGeom prst="straightConnector1">
@@ -4664,7 +4289,7 @@
         </p:nvCxnSpPr>
         <p:spPr>
           <a:xfrm flipH="1">
-            <a:off x="8044912" y="2933704"/>
+            <a:off x="5498024" y="2933704"/>
             <a:ext cx="586739" cy="0"/>
           </a:xfrm>
           <a:prstGeom prst="straightConnector1">
@@ -4701,7 +4326,7 @@
         </p:nvCxnSpPr>
         <p:spPr>
           <a:xfrm>
-            <a:off x="8063231" y="3234039"/>
+            <a:off x="5516343" y="3234039"/>
             <a:ext cx="586737" cy="0"/>
           </a:xfrm>
           <a:prstGeom prst="straightConnector1">
@@ -4738,7 +4363,7 @@
         </p:nvCxnSpPr>
         <p:spPr>
           <a:xfrm flipH="1">
-            <a:off x="8060609" y="3310239"/>
+            <a:off x="5513721" y="3310239"/>
             <a:ext cx="586739" cy="0"/>
           </a:xfrm>
           <a:prstGeom prst="straightConnector1">
@@ -4775,8 +4400,8 @@
         </p:nvSpPr>
         <p:spPr>
           <a:xfrm>
-            <a:off x="8667750" y="2857504"/>
-            <a:ext cx="717120" cy="461665"/>
+            <a:off x="6145420" y="2857504"/>
+            <a:ext cx="668003" cy="461665"/>
           </a:xfrm>
           <a:prstGeom prst="rect">
             <a:avLst/>
@@ -4796,8 +4421,13 @@
                 <a:ea typeface="Tahoma" pitchFamily="34" charset="0"/>
                 <a:cs typeface="Tahoma" pitchFamily="34" charset="0"/>
               </a:rPr>
-              <a:t>Minerva</a:t>
-            </a:r>
+              <a:t>Server</a:t>
+            </a:r>
+            <a:endParaRPr lang="en-US" sz="1200" dirty="0" smtClean="0">
+              <a:latin typeface="Tahoma" pitchFamily="34" charset="0"/>
+              <a:ea typeface="Tahoma" pitchFamily="34" charset="0"/>
+              <a:cs typeface="Tahoma" pitchFamily="34" charset="0"/>
+            </a:endParaRPr>
           </a:p>
           <a:p>
             <a:pPr algn="ctr"/>
@@ -4825,7 +4455,7 @@
         </p:nvSpPr>
         <p:spPr>
           <a:xfrm>
-            <a:off x="7042688" y="2133600"/>
+            <a:off x="4495800" y="2103477"/>
             <a:ext cx="1186912" cy="553998"/>
           </a:xfrm>
           <a:prstGeom prst="rect">
@@ -4863,8 +4493,8 @@
         </p:nvSpPr>
         <p:spPr>
           <a:xfrm>
-            <a:off x="8188841" y="2133600"/>
-            <a:ext cx="2098159" cy="553998"/>
+            <a:off x="5641952" y="2105025"/>
+            <a:ext cx="2511448" cy="553998"/>
           </a:xfrm>
           <a:prstGeom prst="rect">
             <a:avLst/>
@@ -4883,7 +4513,15 @@
                 <a:ea typeface="Tahoma" pitchFamily="34" charset="0"/>
                 <a:cs typeface="Tahoma" pitchFamily="34" charset="0"/>
               </a:rPr>
-              <a:t>Stream receives new transports.</a:t>
+              <a:t>Server Stream listens for new transports</a:t>
+            </a:r>
+            <a:r>
+              <a:rPr lang="en-US" sz="1000" dirty="0" smtClean="0">
+                <a:latin typeface="Tahoma" pitchFamily="34" charset="0"/>
+                <a:ea typeface="Tahoma" pitchFamily="34" charset="0"/>
+                <a:cs typeface="Tahoma" pitchFamily="34" charset="0"/>
+              </a:rPr>
+              <a:t>.</a:t>
             </a:r>
           </a:p>
           <a:p>
@@ -4960,7 +4598,7 @@
         </p:nvSpPr>
         <p:spPr>
           <a:xfrm>
-            <a:off x="7997745" y="3381315"/>
+            <a:off x="5450857" y="3381315"/>
             <a:ext cx="775336" cy="553998"/>
           </a:xfrm>
           <a:prstGeom prst="rect">
@@ -4993,47 +4631,13 @@
       </p:sp>
       <p:sp>
         <p:nvSpPr>
-          <p:cNvPr id="57" name="TextBox 56"/>
-          <p:cNvSpPr txBox="1"/>
-          <p:nvPr/>
-        </p:nvSpPr>
-        <p:spPr>
-          <a:xfrm>
-            <a:off x="6343343" y="3409890"/>
-            <a:ext cx="915923" cy="400110"/>
-          </a:xfrm>
-          <a:prstGeom prst="rect">
-            <a:avLst/>
-          </a:prstGeom>
-          <a:noFill/>
-        </p:spPr>
-        <p:txBody>
-          <a:bodyPr wrap="square" rtlCol="0">
-            <a:spAutoFit/>
-          </a:bodyPr>
-          <a:lstStyle/>
-          <a:p>
-            <a:pPr algn="ctr"/>
-            <a:r>
-              <a:rPr lang="en-US" sz="1000" dirty="0" smtClean="0">
-                <a:latin typeface="Tahoma" pitchFamily="34" charset="0"/>
-                <a:ea typeface="Tahoma" pitchFamily="34" charset="0"/>
-                <a:cs typeface="Tahoma" pitchFamily="34" charset="0"/>
-              </a:rPr>
-              <a:t>Minerva wire protocol</a:t>
-            </a:r>
-          </a:p>
-        </p:txBody>
-      </p:sp>
-      <p:sp>
-        <p:nvSpPr>
           <p:cNvPr id="58" name="TextBox 57"/>
           <p:cNvSpPr txBox="1"/>
           <p:nvPr/>
         </p:nvSpPr>
         <p:spPr>
           <a:xfrm>
-            <a:off x="10033052" y="2924014"/>
+            <a:off x="7486164" y="2924014"/>
             <a:ext cx="919547" cy="276999"/>
           </a:xfrm>
           <a:prstGeom prst="rect">
@@ -5071,7 +4675,7 @@
         </p:nvCxnSpPr>
         <p:spPr>
           <a:xfrm>
-            <a:off x="9411922" y="3048000"/>
+            <a:off x="6865034" y="3048000"/>
             <a:ext cx="586737" cy="0"/>
           </a:xfrm>
           <a:prstGeom prst="straightConnector1">
@@ -5108,7 +4712,7 @@
         </p:nvCxnSpPr>
         <p:spPr>
           <a:xfrm flipH="1">
-            <a:off x="9411920" y="3124200"/>
+            <a:off x="6865032" y="3124200"/>
             <a:ext cx="586739" cy="0"/>
           </a:xfrm>
           <a:prstGeom prst="straightConnector1">
@@ -5145,7 +4749,7 @@
         </p:nvSpPr>
         <p:spPr>
           <a:xfrm>
-            <a:off x="9182100" y="3208377"/>
+            <a:off x="6635212" y="3208377"/>
             <a:ext cx="1066800" cy="553998"/>
           </a:xfrm>
           <a:prstGeom prst="rect">
@@ -5274,7 +4878,7 @@
         <p:spPr>
           <a:xfrm>
             <a:off x="152400" y="4648200"/>
-            <a:ext cx="9951242" cy="646331"/>
+            <a:ext cx="9220200" cy="830997"/>
           </a:xfrm>
           <a:prstGeom prst="rect">
             <a:avLst/>
@@ -5293,7 +4897,7 @@
                 <a:ea typeface="Tahoma" pitchFamily="34" charset="0"/>
                 <a:cs typeface="Tahoma" pitchFamily="34" charset="0"/>
               </a:rPr>
-              <a:t>Minerva strings are restricted to 0x20 (“ </a:t>
+              <a:t>For maximum compatibility </a:t>
             </a:r>
             <a:r>
               <a:rPr lang="en-US" sz="1200" dirty="0" smtClean="0">
@@ -5301,7 +4905,7 @@
                 <a:ea typeface="Tahoma" pitchFamily="34" charset="0"/>
                 <a:cs typeface="Tahoma" pitchFamily="34" charset="0"/>
               </a:rPr>
-              <a:t>”</a:t>
+              <a:t>with current and future transports, and for client-side flow control reasons, </a:t>
             </a:r>
             <a:r>
               <a:rPr lang="en-US" sz="1200" dirty="0" smtClean="0">
@@ -5309,7 +4913,7 @@
                 <a:ea typeface="Tahoma" pitchFamily="34" charset="0"/>
                 <a:cs typeface="Tahoma" pitchFamily="34" charset="0"/>
               </a:rPr>
-              <a:t>) – 0x7E (“~”), allowing these 95 characters (“ </a:t>
+              <a:t>Minerva </a:t>
             </a:r>
             <a:r>
               <a:rPr lang="en-US" sz="1200" dirty="0" smtClean="0">
@@ -5317,7 +4921,7 @@
                 <a:ea typeface="Tahoma" pitchFamily="34" charset="0"/>
                 <a:cs typeface="Tahoma" pitchFamily="34" charset="0"/>
               </a:rPr>
-              <a:t>”</a:t>
+              <a:t>strings are restricted to </a:t>
             </a:r>
             <a:r>
               <a:rPr lang="en-US" sz="1200" dirty="0" smtClean="0">
@@ -5325,7 +4929,15 @@
                 <a:ea typeface="Tahoma" pitchFamily="34" charset="0"/>
                 <a:cs typeface="Tahoma" pitchFamily="34" charset="0"/>
               </a:rPr>
-              <a:t> is first):</a:t>
+              <a:t>a range of characters. The range is 0x20 </a:t>
+            </a:r>
+            <a:r>
+              <a:rPr lang="en-US" sz="1200" dirty="0" smtClean="0">
+                <a:latin typeface="Tahoma" pitchFamily="34" charset="0"/>
+                <a:ea typeface="Tahoma" pitchFamily="34" charset="0"/>
+                <a:cs typeface="Tahoma" pitchFamily="34" charset="0"/>
+              </a:rPr>
+              <a:t>(“ ”) – 0x7E (“~”), allowing these 95 characters (“ ” is first):</a:t>
             </a:r>
           </a:p>
           <a:p>
@@ -5377,7 +4989,23 @@
                 <a:ea typeface="Tahoma" pitchFamily="34" charset="0"/>
                 <a:cs typeface="Tahoma" pitchFamily="34" charset="0"/>
               </a:rPr>
-              <a:t>Transport creates only one HTTP request or one TCP connection. Not reused.</a:t>
+              <a:t>Transport creates only one </a:t>
+            </a:r>
+            <a:r>
+              <a:rPr lang="en-US" sz="1000" dirty="0" smtClean="0">
+                <a:latin typeface="Tahoma" pitchFamily="34" charset="0"/>
+                <a:ea typeface="Tahoma" pitchFamily="34" charset="0"/>
+                <a:cs typeface="Tahoma" pitchFamily="34" charset="0"/>
+              </a:rPr>
+              <a:t>TCP connection or one HTTP request. </a:t>
+            </a:r>
+            <a:r>
+              <a:rPr lang="en-US" sz="1000" dirty="0" smtClean="0">
+                <a:latin typeface="Tahoma" pitchFamily="34" charset="0"/>
+                <a:ea typeface="Tahoma" pitchFamily="34" charset="0"/>
+                <a:cs typeface="Tahoma" pitchFamily="34" charset="0"/>
+              </a:rPr>
+              <a:t>Not reused.</a:t>
             </a:r>
             <a:endParaRPr lang="en-US" sz="1000" dirty="0">
               <a:latin typeface="Tahoma" pitchFamily="34" charset="0"/>

</xml_diff>

<commit_message>
docs/data_flow.pptx: fix a minor mistake: \' -> '
</commit_message>
<xml_diff>
--- a/docs/data_flow.pptx
+++ b/docs/data_flow.pptx
@@ -288,7 +288,7 @@
           <a:p>
             <a:fld id="{BB8F1B3F-F425-43A1-A5D6-4A28EB036C8A}" type="datetimeFigureOut">
               <a:rPr lang="en-US" smtClean="0"/>
-              <a:t>2010-06-10</a:t>
+              <a:t>2010-09-23</a:t>
             </a:fld>
             <a:endParaRPr lang="en-US"/>
           </a:p>
@@ -458,7 +458,7 @@
           <a:p>
             <a:fld id="{BB8F1B3F-F425-43A1-A5D6-4A28EB036C8A}" type="datetimeFigureOut">
               <a:rPr lang="en-US" smtClean="0"/>
-              <a:t>2010-06-10</a:t>
+              <a:t>2010-09-23</a:t>
             </a:fld>
             <a:endParaRPr lang="en-US"/>
           </a:p>
@@ -638,7 +638,7 @@
           <a:p>
             <a:fld id="{BB8F1B3F-F425-43A1-A5D6-4A28EB036C8A}" type="datetimeFigureOut">
               <a:rPr lang="en-US" smtClean="0"/>
-              <a:t>2010-06-10</a:t>
+              <a:t>2010-09-23</a:t>
             </a:fld>
             <a:endParaRPr lang="en-US"/>
           </a:p>
@@ -808,7 +808,7 @@
           <a:p>
             <a:fld id="{BB8F1B3F-F425-43A1-A5D6-4A28EB036C8A}" type="datetimeFigureOut">
               <a:rPr lang="en-US" smtClean="0"/>
-              <a:t>2010-06-10</a:t>
+              <a:t>2010-09-23</a:t>
             </a:fld>
             <a:endParaRPr lang="en-US"/>
           </a:p>
@@ -1054,7 +1054,7 @@
           <a:p>
             <a:fld id="{BB8F1B3F-F425-43A1-A5D6-4A28EB036C8A}" type="datetimeFigureOut">
               <a:rPr lang="en-US" smtClean="0"/>
-              <a:t>2010-06-10</a:t>
+              <a:t>2010-09-23</a:t>
             </a:fld>
             <a:endParaRPr lang="en-US"/>
           </a:p>
@@ -1342,7 +1342,7 @@
           <a:p>
             <a:fld id="{BB8F1B3F-F425-43A1-A5D6-4A28EB036C8A}" type="datetimeFigureOut">
               <a:rPr lang="en-US" smtClean="0"/>
-              <a:t>2010-06-10</a:t>
+              <a:t>2010-09-23</a:t>
             </a:fld>
             <a:endParaRPr lang="en-US"/>
           </a:p>
@@ -1769,7 +1769,7 @@
           <a:p>
             <a:fld id="{BB8F1B3F-F425-43A1-A5D6-4A28EB036C8A}" type="datetimeFigureOut">
               <a:rPr lang="en-US" smtClean="0"/>
-              <a:t>2010-06-10</a:t>
+              <a:t>2010-09-23</a:t>
             </a:fld>
             <a:endParaRPr lang="en-US"/>
           </a:p>
@@ -1887,7 +1887,7 @@
           <a:p>
             <a:fld id="{BB8F1B3F-F425-43A1-A5D6-4A28EB036C8A}" type="datetimeFigureOut">
               <a:rPr lang="en-US" smtClean="0"/>
-              <a:t>2010-06-10</a:t>
+              <a:t>2010-09-23</a:t>
             </a:fld>
             <a:endParaRPr lang="en-US"/>
           </a:p>
@@ -1982,7 +1982,7 @@
           <a:p>
             <a:fld id="{BB8F1B3F-F425-43A1-A5D6-4A28EB036C8A}" type="datetimeFigureOut">
               <a:rPr lang="en-US" smtClean="0"/>
-              <a:t>2010-06-10</a:t>
+              <a:t>2010-09-23</a:t>
             </a:fld>
             <a:endParaRPr lang="en-US"/>
           </a:p>
@@ -2259,7 +2259,7 @@
           <a:p>
             <a:fld id="{BB8F1B3F-F425-43A1-A5D6-4A28EB036C8A}" type="datetimeFigureOut">
               <a:rPr lang="en-US" smtClean="0"/>
-              <a:t>2010-06-10</a:t>
+              <a:t>2010-09-23</a:t>
             </a:fld>
             <a:endParaRPr lang="en-US"/>
           </a:p>
@@ -2512,7 +2512,7 @@
           <a:p>
             <a:fld id="{BB8F1B3F-F425-43A1-A5D6-4A28EB036C8A}" type="datetimeFigureOut">
               <a:rPr lang="en-US" smtClean="0"/>
-              <a:t>2010-06-10</a:t>
+              <a:t>2010-09-23</a:t>
             </a:fld>
             <a:endParaRPr lang="en-US"/>
           </a:p>
@@ -2725,7 +2725,7 @@
           <a:p>
             <a:fld id="{BB8F1B3F-F425-43A1-A5D6-4A28EB036C8A}" type="datetimeFigureOut">
               <a:rPr lang="en-US" smtClean="0"/>
-              <a:t>2010-06-10</a:t>
+              <a:t>2010-09-23</a:t>
             </a:fld>
             <a:endParaRPr lang="en-US"/>
           </a:p>
@@ -3243,11 +3243,6 @@
               </a:rPr>
               <a:t>Client</a:t>
             </a:r>
-            <a:endParaRPr lang="en-US" sz="1200" dirty="0" smtClean="0">
-              <a:latin typeface="Tahoma" pitchFamily="34" charset="0"/>
-              <a:ea typeface="Tahoma" pitchFamily="34" charset="0"/>
-              <a:cs typeface="Tahoma" pitchFamily="34" charset="0"/>
-            </a:endParaRPr>
           </a:p>
           <a:p>
             <a:pPr algn="ctr"/>
@@ -3295,15 +3290,7 @@
                 <a:ea typeface="Tahoma" pitchFamily="34" charset="0"/>
                 <a:cs typeface="Tahoma" pitchFamily="34" charset="0"/>
               </a:rPr>
-              <a:t>Client Stream </a:t>
-            </a:r>
-            <a:r>
-              <a:rPr lang="en-US" sz="1000" dirty="0" smtClean="0">
-                <a:latin typeface="Tahoma" pitchFamily="34" charset="0"/>
-                <a:ea typeface="Tahoma" pitchFamily="34" charset="0"/>
-                <a:cs typeface="Tahoma" pitchFamily="34" charset="0"/>
-              </a:rPr>
-              <a:t>creates transports.</a:t>
+              <a:t>Client Stream creates transports.</a:t>
             </a:r>
           </a:p>
           <a:p>
@@ -3716,31 +3703,7 @@
                 <a:ea typeface="Tahoma" pitchFamily="34" charset="0"/>
                 <a:cs typeface="Tahoma" pitchFamily="34" charset="0"/>
               </a:rPr>
-              <a:t>Primary receives strings. Secondary transport </a:t>
-            </a:r>
-            <a:r>
-              <a:rPr lang="en-US" sz="1000" dirty="0" smtClean="0">
-                <a:latin typeface="Tahoma" pitchFamily="34" charset="0"/>
-                <a:ea typeface="Tahoma" pitchFamily="34" charset="0"/>
-                <a:cs typeface="Tahoma" pitchFamily="34" charset="0"/>
-              </a:rPr>
-              <a:t>is only </a:t>
-            </a:r>
-            <a:r>
-              <a:rPr lang="en-US" sz="1000" dirty="0" smtClean="0">
-                <a:latin typeface="Tahoma" pitchFamily="34" charset="0"/>
-                <a:ea typeface="Tahoma" pitchFamily="34" charset="0"/>
-                <a:cs typeface="Tahoma" pitchFamily="34" charset="0"/>
-              </a:rPr>
-              <a:t>needed if primary is </a:t>
-            </a:r>
-            <a:r>
-              <a:rPr lang="en-US" sz="1000" dirty="0" smtClean="0">
-                <a:latin typeface="Tahoma" pitchFamily="34" charset="0"/>
-                <a:ea typeface="Tahoma" pitchFamily="34" charset="0"/>
-                <a:cs typeface="Tahoma" pitchFamily="34" charset="0"/>
-              </a:rPr>
-              <a:t>HTTP,</a:t>
+              <a:t>Primary receives strings. Secondary transport is only needed if primary is HTTP,</a:t>
             </a:r>
           </a:p>
           <a:p>
@@ -3766,31 +3729,7 @@
                 <a:ea typeface="Tahoma" pitchFamily="34" charset="0"/>
                 <a:cs typeface="Tahoma" pitchFamily="34" charset="0"/>
               </a:rPr>
-              <a:t>an’t </a:t>
-            </a:r>
-            <a:r>
-              <a:rPr lang="en-US" sz="1000" dirty="0" smtClean="0">
-                <a:latin typeface="Tahoma" pitchFamily="34" charset="0"/>
-                <a:ea typeface="Tahoma" pitchFamily="34" charset="0"/>
-                <a:cs typeface="Tahoma" pitchFamily="34" charset="0"/>
-              </a:rPr>
-              <a:t>upload data </a:t>
-            </a:r>
-            <a:r>
-              <a:rPr lang="en-US" sz="1000" dirty="0" smtClean="0">
-                <a:latin typeface="Tahoma" pitchFamily="34" charset="0"/>
-                <a:ea typeface="Tahoma" pitchFamily="34" charset="0"/>
-                <a:cs typeface="Tahoma" pitchFamily="34" charset="0"/>
-              </a:rPr>
-              <a:t>after opening HTTP </a:t>
-            </a:r>
-            <a:r>
-              <a:rPr lang="en-US" sz="1000" dirty="0" smtClean="0">
-                <a:latin typeface="Tahoma" pitchFamily="34" charset="0"/>
-                <a:ea typeface="Tahoma" pitchFamily="34" charset="0"/>
-                <a:cs typeface="Tahoma" pitchFamily="34" charset="0"/>
-              </a:rPr>
-              <a:t>request.</a:t>
+              <a:t>an’t upload data after opening HTTP request.</a:t>
             </a:r>
             <a:endParaRPr lang="en-US" sz="1000" dirty="0">
               <a:latin typeface="Tahoma" pitchFamily="34" charset="0"/>
@@ -4423,11 +4362,6 @@
               </a:rPr>
               <a:t>Server</a:t>
             </a:r>
-            <a:endParaRPr lang="en-US" sz="1200" dirty="0" smtClean="0">
-              <a:latin typeface="Tahoma" pitchFamily="34" charset="0"/>
-              <a:ea typeface="Tahoma" pitchFamily="34" charset="0"/>
-              <a:cs typeface="Tahoma" pitchFamily="34" charset="0"/>
-            </a:endParaRPr>
           </a:p>
           <a:p>
             <a:pPr algn="ctr"/>
@@ -4513,15 +4447,7 @@
                 <a:ea typeface="Tahoma" pitchFamily="34" charset="0"/>
                 <a:cs typeface="Tahoma" pitchFamily="34" charset="0"/>
               </a:rPr>
-              <a:t>Server Stream listens for new transports</a:t>
-            </a:r>
-            <a:r>
-              <a:rPr lang="en-US" sz="1000" dirty="0" smtClean="0">
-                <a:latin typeface="Tahoma" pitchFamily="34" charset="0"/>
-                <a:ea typeface="Tahoma" pitchFamily="34" charset="0"/>
-                <a:cs typeface="Tahoma" pitchFamily="34" charset="0"/>
-              </a:rPr>
-              <a:t>.</a:t>
+              <a:t>Server Stream listens for new transports.</a:t>
             </a:r>
           </a:p>
           <a:p>
@@ -4897,57 +4823,33 @@
                 <a:ea typeface="Tahoma" pitchFamily="34" charset="0"/>
                 <a:cs typeface="Tahoma" pitchFamily="34" charset="0"/>
               </a:rPr>
-              <a:t>For maximum compatibility </a:t>
-            </a:r>
-            <a:r>
-              <a:rPr lang="en-US" sz="1200" dirty="0" smtClean="0">
-                <a:latin typeface="Tahoma" pitchFamily="34" charset="0"/>
+              <a:t>For maximum compatibility with current and future transports, and for client-side flow control reasons, Minerva strings are restricted to a range of characters. The range is 0x20 (“ ”) – 0x7E (“~”), allowing these 95 characters (“ ” is first):</a:t>
+            </a:r>
+          </a:p>
+          <a:p>
+            <a:r>
+              <a:rPr lang="en-US" sz="1200" smtClean="0">
+                <a:latin typeface="Courier New" pitchFamily="49" charset="0"/>
                 <a:ea typeface="Tahoma" pitchFamily="34" charset="0"/>
-                <a:cs typeface="Tahoma" pitchFamily="34" charset="0"/>
+                <a:cs typeface="Courier New" pitchFamily="49" charset="0"/>
               </a:rPr>
-              <a:t>with current and future transports, and for client-side flow control reasons, </a:t>
-            </a:r>
-            <a:r>
-              <a:rPr lang="en-US" sz="1200" dirty="0" smtClean="0">
-                <a:latin typeface="Tahoma" pitchFamily="34" charset="0"/>
+              <a:t> </a:t>
+            </a:r>
+            <a:r>
+              <a:rPr lang="en-US" sz="1200" smtClean="0">
+                <a:latin typeface="Courier New" pitchFamily="49" charset="0"/>
                 <a:ea typeface="Tahoma" pitchFamily="34" charset="0"/>
-                <a:cs typeface="Tahoma" pitchFamily="34" charset="0"/>
+                <a:cs typeface="Courier New" pitchFamily="49" charset="0"/>
               </a:rPr>
-              <a:t>Minerva </a:t>
-            </a:r>
-            <a:r>
-              <a:rPr lang="en-US" sz="1200" dirty="0" smtClean="0">
-                <a:latin typeface="Tahoma" pitchFamily="34" charset="0"/>
-                <a:ea typeface="Tahoma" pitchFamily="34" charset="0"/>
-                <a:cs typeface="Tahoma" pitchFamily="34" charset="0"/>
-              </a:rPr>
-              <a:t>strings are restricted to </a:t>
-            </a:r>
-            <a:r>
-              <a:rPr lang="en-US" sz="1200" dirty="0" smtClean="0">
-                <a:latin typeface="Tahoma" pitchFamily="34" charset="0"/>
-                <a:ea typeface="Tahoma" pitchFamily="34" charset="0"/>
-                <a:cs typeface="Tahoma" pitchFamily="34" charset="0"/>
-              </a:rPr>
-              <a:t>a range of characters. The range is 0x20 </a:t>
-            </a:r>
-            <a:r>
-              <a:rPr lang="en-US" sz="1200" dirty="0" smtClean="0">
-                <a:latin typeface="Tahoma" pitchFamily="34" charset="0"/>
-                <a:ea typeface="Tahoma" pitchFamily="34" charset="0"/>
-                <a:cs typeface="Tahoma" pitchFamily="34" charset="0"/>
-              </a:rPr>
-              <a:t>(“ ”) – 0x7E (“~”), allowing these 95 characters (“ ” is first):</a:t>
-            </a:r>
-          </a:p>
-          <a:p>
+              <a:t>!"#$%&amp;'()*+,-./</a:t>
+            </a:r>
             <a:r>
               <a:rPr lang="en-US" sz="1200" dirty="0" smtClean="0">
                 <a:latin typeface="Courier New" pitchFamily="49" charset="0"/>
                 <a:ea typeface="Tahoma" pitchFamily="34" charset="0"/>
                 <a:cs typeface="Courier New" pitchFamily="49" charset="0"/>
               </a:rPr>
-              <a:t> !"#$%&amp;\'()*+,-./0123456789:;&lt;=&gt;?@ABCDEFGHIJKLMNOPQRSTUVWXYZ[\]^_`abcdefghijklmnopqrstuvwxyz{|}~</a:t>
+              <a:t>0123456789:;&lt;=&gt;?@ABCDEFGHIJKLMNOPQRSTUVWXYZ[\]^_`abcdefghijklmnopqrstuvwxyz{|}~</a:t>
             </a:r>
           </a:p>
           <a:p>
@@ -4989,23 +4891,7 @@
                 <a:ea typeface="Tahoma" pitchFamily="34" charset="0"/>
                 <a:cs typeface="Tahoma" pitchFamily="34" charset="0"/>
               </a:rPr>
-              <a:t>Transport creates only one </a:t>
-            </a:r>
-            <a:r>
-              <a:rPr lang="en-US" sz="1000" dirty="0" smtClean="0">
-                <a:latin typeface="Tahoma" pitchFamily="34" charset="0"/>
-                <a:ea typeface="Tahoma" pitchFamily="34" charset="0"/>
-                <a:cs typeface="Tahoma" pitchFamily="34" charset="0"/>
-              </a:rPr>
-              <a:t>TCP connection or one HTTP request. </a:t>
-            </a:r>
-            <a:r>
-              <a:rPr lang="en-US" sz="1000" dirty="0" smtClean="0">
-                <a:latin typeface="Tahoma" pitchFamily="34" charset="0"/>
-                <a:ea typeface="Tahoma" pitchFamily="34" charset="0"/>
-                <a:cs typeface="Tahoma" pitchFamily="34" charset="0"/>
-              </a:rPr>
-              <a:t>Not reused.</a:t>
+              <a:t>Transport creates only one TCP connection or one HTTP request. Not reused.</a:t>
             </a:r>
             <a:endParaRPr lang="en-US" sz="1000" dirty="0">
               <a:latin typeface="Tahoma" pitchFamily="34" charset="0"/>

</xml_diff>